<commit_message>
revise spring 2022 lecture4 slides
</commit_message>
<xml_diff>
--- a/files/course_material/2022_Spring/PPT/Lecture4.pptx
+++ b/files/course_material/2022_Spring/PPT/Lecture4.pptx
@@ -5,10 +5,10 @@
     <p:sldMasterId id="2147483648" r:id="rId1"/>
   </p:sldMasterIdLst>
   <p:notesMasterIdLst>
-    <p:notesMasterId r:id="rId50"/>
+    <p:notesMasterId r:id="rId51"/>
   </p:notesMasterIdLst>
   <p:handoutMasterIdLst>
-    <p:handoutMasterId r:id="rId51"/>
+    <p:handoutMasterId r:id="rId52"/>
   </p:handoutMasterIdLst>
   <p:sldIdLst>
     <p:sldId id="256" r:id="rId2"/>
@@ -52,13 +52,14 @@
     <p:sldId id="304" r:id="rId40"/>
     <p:sldId id="305" r:id="rId41"/>
     <p:sldId id="306" r:id="rId42"/>
-    <p:sldId id="307" r:id="rId43"/>
-    <p:sldId id="308" r:id="rId44"/>
-    <p:sldId id="309" r:id="rId45"/>
-    <p:sldId id="310" r:id="rId46"/>
-    <p:sldId id="311" r:id="rId47"/>
-    <p:sldId id="312" r:id="rId48"/>
-    <p:sldId id="268" r:id="rId49"/>
+    <p:sldId id="314" r:id="rId43"/>
+    <p:sldId id="307" r:id="rId44"/>
+    <p:sldId id="308" r:id="rId45"/>
+    <p:sldId id="309" r:id="rId46"/>
+    <p:sldId id="310" r:id="rId47"/>
+    <p:sldId id="311" r:id="rId48"/>
+    <p:sldId id="312" r:id="rId49"/>
+    <p:sldId id="268" r:id="rId50"/>
   </p:sldIdLst>
   <p:sldSz cx="12192000" cy="6858000"/>
   <p:notesSz cx="6858000" cy="9144000"/>
@@ -250,7 +251,7 @@
           <a:p>
             <a:fld id="{D1D9D5B2-5D7A-4763-8DB5-E223CE43EB7B}" type="datetimeFigureOut">
               <a:rPr lang="zh-TW" altLang="en-US" smtClean="0"/>
-              <a:t>2022/2/17</a:t>
+              <a:t>2022/4/6</a:t>
             </a:fld>
             <a:endParaRPr lang="zh-TW" altLang="en-US"/>
           </a:p>
@@ -415,7 +416,7 @@
           <a:p>
             <a:fld id="{5C6EDD7B-3C59-42F5-83C0-F26EC9B997CE}" type="datetimeFigureOut">
               <a:rPr lang="zh-TW" altLang="en-US" smtClean="0"/>
-              <a:t>2022/2/17</a:t>
+              <a:t>2022/4/6</a:t>
             </a:fld>
             <a:endParaRPr lang="zh-TW" altLang="en-US"/>
           </a:p>
@@ -814,7 +815,7 @@
           <a:p>
             <a:r>
               <a:rPr lang="en-US" altLang="zh-TW" smtClean="0"/>
-              <a:t>February 2022</a:t>
+              <a:t>April 2022</a:t>
             </a:r>
             <a:endParaRPr lang="zh-TW" altLang="en-US"/>
           </a:p>
@@ -1018,7 +1019,7 @@
           <a:p>
             <a:r>
               <a:rPr lang="en-US" altLang="zh-TW" smtClean="0"/>
-              <a:t>February 2022</a:t>
+              <a:t>April 2022</a:t>
             </a:r>
             <a:endParaRPr lang="zh-TW" altLang="en-US"/>
           </a:p>
@@ -1202,7 +1203,7 @@
           <a:p>
             <a:r>
               <a:rPr lang="en-US" altLang="zh-TW" smtClean="0"/>
-              <a:t>February 2022</a:t>
+              <a:t>April 2022</a:t>
             </a:r>
             <a:endParaRPr lang="zh-TW" altLang="en-US"/>
           </a:p>
@@ -1392,7 +1393,7 @@
           <a:p>
             <a:r>
               <a:rPr lang="en-US" altLang="zh-TW" smtClean="0"/>
-              <a:t>February 2022</a:t>
+              <a:t>April 2022</a:t>
             </a:r>
             <a:endParaRPr lang="zh-TW" altLang="en-US"/>
           </a:p>
@@ -1649,7 +1650,7 @@
           <a:p>
             <a:r>
               <a:rPr lang="en-US" altLang="zh-TW" smtClean="0"/>
-              <a:t>February 2022</a:t>
+              <a:t>April 2022</a:t>
             </a:r>
             <a:endParaRPr lang="zh-TW" altLang="en-US"/>
           </a:p>
@@ -1954,7 +1955,7 @@
           <a:p>
             <a:r>
               <a:rPr lang="en-US" altLang="zh-TW" smtClean="0"/>
-              <a:t>February 2022</a:t>
+              <a:t>April 2022</a:t>
             </a:r>
             <a:endParaRPr lang="zh-TW" altLang="en-US"/>
           </a:p>
@@ -2332,7 +2333,7 @@
           <a:p>
             <a:r>
               <a:rPr lang="en-US" altLang="zh-TW" smtClean="0"/>
-              <a:t>February 2022</a:t>
+              <a:t>April 2022</a:t>
             </a:r>
             <a:endParaRPr lang="zh-TW" altLang="en-US"/>
           </a:p>
@@ -2454,7 +2455,7 @@
           <a:p>
             <a:r>
               <a:rPr lang="en-US" altLang="zh-TW" smtClean="0"/>
-              <a:t>February 2022</a:t>
+              <a:t>April 2022</a:t>
             </a:r>
             <a:endParaRPr lang="zh-TW" altLang="en-US"/>
           </a:p>
@@ -2553,7 +2554,7 @@
           <a:p>
             <a:r>
               <a:rPr lang="en-US" altLang="zh-TW" smtClean="0"/>
-              <a:t>February 2022</a:t>
+              <a:t>April 2022</a:t>
             </a:r>
             <a:endParaRPr lang="zh-TW" altLang="en-US"/>
           </a:p>
@@ -2834,7 +2835,7 @@
           <a:p>
             <a:r>
               <a:rPr lang="en-US" altLang="zh-TW" smtClean="0"/>
-              <a:t>February 2022</a:t>
+              <a:t>April 2022</a:t>
             </a:r>
             <a:endParaRPr lang="zh-TW" altLang="en-US"/>
           </a:p>
@@ -3091,7 +3092,7 @@
           <a:p>
             <a:r>
               <a:rPr lang="en-US" altLang="zh-TW" smtClean="0"/>
-              <a:t>February 2022</a:t>
+              <a:t>April 2022</a:t>
             </a:r>
             <a:endParaRPr lang="zh-TW" altLang="en-US"/>
           </a:p>
@@ -3308,7 +3309,7 @@
           <a:p>
             <a:r>
               <a:rPr lang="en-US" altLang="zh-TW" smtClean="0"/>
-              <a:t>February 2022</a:t>
+              <a:t>April 2022</a:t>
             </a:r>
             <a:endParaRPr lang="zh-TW" altLang="en-US"/>
           </a:p>
@@ -3829,7 +3830,7 @@
           <a:p>
             <a:r>
               <a:rPr lang="en-US" altLang="zh-TW" smtClean="0"/>
-              <a:t>February 2022</a:t>
+              <a:t>April 2022</a:t>
             </a:r>
             <a:endParaRPr lang="zh-TW" altLang="en-US" dirty="0"/>
           </a:p>
@@ -4436,7 +4437,7 @@
           <a:p>
             <a:r>
               <a:rPr lang="en-US" altLang="zh-TW" smtClean="0"/>
-              <a:t>February 2022</a:t>
+              <a:t>April 2022</a:t>
             </a:r>
             <a:endParaRPr lang="zh-TW" altLang="en-US"/>
           </a:p>
@@ -4745,7 +4746,7 @@
           <a:p>
             <a:r>
               <a:rPr lang="en-US" altLang="zh-TW" smtClean="0"/>
-              <a:t>February 2022</a:t>
+              <a:t>April 2022</a:t>
             </a:r>
             <a:endParaRPr lang="zh-TW" altLang="en-US"/>
           </a:p>
@@ -4936,7 +4937,7 @@
           <a:p>
             <a:r>
               <a:rPr lang="en-US" altLang="zh-TW" smtClean="0"/>
-              <a:t>February 2022</a:t>
+              <a:t>April 2022</a:t>
             </a:r>
             <a:endParaRPr lang="zh-TW" altLang="en-US"/>
           </a:p>
@@ -5886,7 +5887,7 @@
           <a:p>
             <a:r>
               <a:rPr lang="en-US" altLang="zh-TW" smtClean="0"/>
-              <a:t>February 2022</a:t>
+              <a:t>April 2022</a:t>
             </a:r>
             <a:endParaRPr lang="zh-TW" altLang="en-US"/>
           </a:p>
@@ -6870,7 +6871,7 @@
           <a:p>
             <a:r>
               <a:rPr lang="en-US" altLang="zh-TW" smtClean="0"/>
-              <a:t>February 2022</a:t>
+              <a:t>April 2022</a:t>
             </a:r>
             <a:endParaRPr lang="zh-TW" altLang="en-US" dirty="0"/>
           </a:p>
@@ -7017,7 +7018,7 @@
           <a:p>
             <a:r>
               <a:rPr lang="en-US" altLang="zh-TW" smtClean="0"/>
-              <a:t>February 2022</a:t>
+              <a:t>April 2022</a:t>
             </a:r>
             <a:endParaRPr lang="zh-TW" altLang="en-US"/>
           </a:p>
@@ -7193,7 +7194,7 @@
           <a:p>
             <a:r>
               <a:rPr lang="en-US" altLang="zh-TW" smtClean="0"/>
-              <a:t>February 2022</a:t>
+              <a:t>April 2022</a:t>
             </a:r>
             <a:endParaRPr lang="zh-TW" altLang="en-US"/>
           </a:p>
@@ -8439,7 +8440,7 @@
           <a:p>
             <a:r>
               <a:rPr lang="en-US" altLang="zh-TW" smtClean="0"/>
-              <a:t>February 2022</a:t>
+              <a:t>April 2022</a:t>
             </a:r>
             <a:endParaRPr lang="zh-TW" altLang="en-US"/>
           </a:p>
@@ -8590,7 +8591,7 @@
           <a:p>
             <a:r>
               <a:rPr lang="en-US" altLang="zh-TW" smtClean="0"/>
-              <a:t>February 2022</a:t>
+              <a:t>April 2022</a:t>
             </a:r>
             <a:endParaRPr lang="zh-TW" altLang="en-US"/>
           </a:p>
@@ -8790,7 +8791,7 @@
           <a:p>
             <a:r>
               <a:rPr lang="en-US" altLang="zh-TW" smtClean="0"/>
-              <a:t>February 2022</a:t>
+              <a:t>April 2022</a:t>
             </a:r>
             <a:endParaRPr lang="zh-TW" altLang="en-US"/>
           </a:p>
@@ -9111,7 +9112,7 @@
           <a:p>
             <a:r>
               <a:rPr lang="en-US" altLang="zh-TW" smtClean="0"/>
-              <a:t>February 2022</a:t>
+              <a:t>April 2022</a:t>
             </a:r>
             <a:endParaRPr lang="zh-TW" altLang="en-US"/>
           </a:p>
@@ -9346,7 +9347,7 @@
           <a:p>
             <a:r>
               <a:rPr lang="en-US" altLang="zh-TW" smtClean="0"/>
-              <a:t>February 2022</a:t>
+              <a:t>April 2022</a:t>
             </a:r>
             <a:endParaRPr lang="zh-TW" altLang="en-US"/>
           </a:p>
@@ -10176,7 +10177,7 @@
           <a:p>
             <a:r>
               <a:rPr lang="en-US" altLang="zh-TW" smtClean="0"/>
-              <a:t>February 2022</a:t>
+              <a:t>April 2022</a:t>
             </a:r>
             <a:endParaRPr lang="zh-TW" altLang="en-US"/>
           </a:p>
@@ -10493,7 +10494,7 @@
           <a:p>
             <a:r>
               <a:rPr lang="en-US" altLang="zh-TW" smtClean="0"/>
-              <a:t>February 2022</a:t>
+              <a:t>April 2022</a:t>
             </a:r>
             <a:endParaRPr lang="zh-TW" altLang="en-US"/>
           </a:p>
@@ -10643,7 +10644,7 @@
           <a:p>
             <a:r>
               <a:rPr lang="en-US" altLang="zh-TW" smtClean="0"/>
-              <a:t>February 2022</a:t>
+              <a:t>April 2022</a:t>
             </a:r>
             <a:endParaRPr lang="zh-TW" altLang="en-US"/>
           </a:p>
@@ -10793,7 +10794,7 @@
           <a:p>
             <a:r>
               <a:rPr lang="en-US" altLang="zh-TW" smtClean="0"/>
-              <a:t>February 2022</a:t>
+              <a:t>April 2022</a:t>
             </a:r>
             <a:endParaRPr lang="zh-TW" altLang="en-US"/>
           </a:p>
@@ -11462,7 +11463,7 @@
           <a:p>
             <a:r>
               <a:rPr lang="en-US" altLang="zh-TW" smtClean="0"/>
-              <a:t>February 2022</a:t>
+              <a:t>April 2022</a:t>
             </a:r>
             <a:endParaRPr lang="zh-TW" altLang="en-US"/>
           </a:p>
@@ -11703,7 +11704,7 @@
           <a:p>
             <a:r>
               <a:rPr lang="en-US" altLang="zh-TW" smtClean="0"/>
-              <a:t>February 2022</a:t>
+              <a:t>April 2022</a:t>
             </a:r>
             <a:endParaRPr lang="zh-TW" altLang="en-US"/>
           </a:p>
@@ -11837,8 +11838,8 @@
           </a:p>
         </p:txBody>
       </p:sp>
-      <mc:AlternateContent xmlns:mc="http://schemas.openxmlformats.org/markup-compatibility/2006" xmlns:a14="http://schemas.microsoft.com/office/drawing/2010/main">
-        <mc:Choice Requires="a14">
+      <mc:AlternateContent xmlns:mc="http://schemas.openxmlformats.org/markup-compatibility/2006">
+        <mc:Choice xmlns:a14="http://schemas.microsoft.com/office/drawing/2010/main" Requires="a14">
           <p:sp>
             <p:nvSpPr>
               <p:cNvPr id="3" name="內容版面配置區 2"/>
@@ -12978,13 +12979,22 @@
                 <a:pPr lvl="1"/>
                 <a:r>
                   <a:rPr lang="en-US" dirty="0"/>
-                  <a:t>In the AB example, V(A) = 0.7</a:t>
+                  <a:t>In the AB example, V(A) = </a:t>
                 </a:r>
+                <a:r>
+                  <a:rPr lang="en-US" dirty="0" smtClean="0"/>
+                  <a:t>0.7</a:t>
+                </a:r>
+                <a:r>
+                  <a:rPr lang="en-US" altLang="zh-TW" dirty="0" smtClean="0"/>
+                  <a:t>5</a:t>
+                </a:r>
+                <a:endParaRPr lang="en-US" dirty="0"/>
               </a:p>
             </p:txBody>
           </p:sp>
         </mc:Choice>
-        <mc:Fallback xmlns="">
+        <mc:Fallback>
           <p:sp>
             <p:nvSpPr>
               <p:cNvPr id="3" name="內容版面配置區 2"/>
@@ -13035,7 +13045,7 @@
           <a:p>
             <a:r>
               <a:rPr lang="en-US" altLang="zh-TW" smtClean="0"/>
-              <a:t>February 2022</a:t>
+              <a:t>April 2022</a:t>
             </a:r>
             <a:endParaRPr lang="zh-TW" altLang="en-US"/>
           </a:p>
@@ -13223,7 +13233,7 @@
           <a:p>
             <a:r>
               <a:rPr lang="en-US" altLang="zh-TW" smtClean="0"/>
-              <a:t>February 2022</a:t>
+              <a:t>April 2022</a:t>
             </a:r>
             <a:endParaRPr lang="zh-TW" altLang="en-US"/>
           </a:p>
@@ -13598,7 +13608,7 @@
           <a:p>
             <a:r>
               <a:rPr lang="en-US" altLang="zh-TW" smtClean="0"/>
-              <a:t>February 2022</a:t>
+              <a:t>April 2022</a:t>
             </a:r>
             <a:endParaRPr lang="zh-TW" altLang="en-US"/>
           </a:p>
@@ -13820,7 +13830,7 @@
           <a:p>
             <a:r>
               <a:rPr lang="en-US" altLang="zh-TW" smtClean="0"/>
-              <a:t>February 2022</a:t>
+              <a:t>April 2022</a:t>
             </a:r>
             <a:endParaRPr lang="zh-TW" altLang="en-US"/>
           </a:p>
@@ -14273,7 +14283,7 @@
           <a:p>
             <a:r>
               <a:rPr lang="en-US" altLang="zh-TW" smtClean="0"/>
-              <a:t>February 2022</a:t>
+              <a:t>April 2022</a:t>
             </a:r>
             <a:endParaRPr lang="zh-TW" altLang="en-US"/>
           </a:p>
@@ -14676,7 +14686,7 @@
           <a:p>
             <a:r>
               <a:rPr lang="en-US" altLang="zh-TW" smtClean="0"/>
-              <a:t>February 2022</a:t>
+              <a:t>April 2022</a:t>
             </a:r>
             <a:endParaRPr lang="zh-TW" altLang="en-US"/>
           </a:p>
@@ -14932,7 +14942,7 @@
           <a:p>
             <a:r>
               <a:rPr lang="en-US" altLang="zh-TW" smtClean="0"/>
-              <a:t>February 2022</a:t>
+              <a:t>April 2022</a:t>
             </a:r>
             <a:endParaRPr lang="zh-TW" altLang="en-US"/>
           </a:p>
@@ -15082,7 +15092,7 @@
           <a:p>
             <a:r>
               <a:rPr lang="en-US" altLang="zh-TW" smtClean="0"/>
-              <a:t>February 2022</a:t>
+              <a:t>April 2022</a:t>
             </a:r>
             <a:endParaRPr lang="zh-TW" altLang="en-US"/>
           </a:p>
@@ -15227,7 +15237,7 @@
           <a:p>
             <a:r>
               <a:rPr lang="en-US" altLang="zh-TW" smtClean="0"/>
-              <a:t>February 2022</a:t>
+              <a:t>April 2022</a:t>
             </a:r>
             <a:endParaRPr lang="zh-TW" altLang="en-US"/>
           </a:p>
@@ -15370,7 +15380,7 @@
           <a:p>
             <a:r>
               <a:rPr lang="en-US" altLang="zh-TW" smtClean="0"/>
-              <a:t>February 2022</a:t>
+              <a:t>April 2022</a:t>
             </a:r>
             <a:endParaRPr lang="zh-TW" altLang="en-US"/>
           </a:p>
@@ -16714,7 +16724,7 @@
           <a:p>
             <a:r>
               <a:rPr lang="en-US" altLang="zh-TW" smtClean="0"/>
-              <a:t>February 2022</a:t>
+              <a:t>April 2022</a:t>
             </a:r>
             <a:endParaRPr lang="zh-TW" altLang="en-US"/>
           </a:p>
@@ -16864,7 +16874,7 @@
           <a:p>
             <a:r>
               <a:rPr lang="en-US" altLang="zh-TW" smtClean="0"/>
-              <a:t>February 2022</a:t>
+              <a:t>April 2022</a:t>
             </a:r>
             <a:endParaRPr lang="zh-TW" altLang="en-US"/>
           </a:p>
@@ -17035,7 +17045,7 @@
           <a:p>
             <a:r>
               <a:rPr lang="en-US" altLang="zh-TW" smtClean="0"/>
-              <a:t>February 2022</a:t>
+              <a:t>April 2022</a:t>
             </a:r>
             <a:endParaRPr lang="zh-TW" altLang="en-US"/>
           </a:p>
@@ -17893,7 +17903,7 @@
           <a:p>
             <a:r>
               <a:rPr lang="en-US" altLang="zh-TW" smtClean="0"/>
-              <a:t>February 2022</a:t>
+              <a:t>April 2022</a:t>
             </a:r>
             <a:endParaRPr lang="zh-TW" altLang="en-US"/>
           </a:p>
@@ -18034,7 +18044,7 @@
           <a:p>
             <a:r>
               <a:rPr lang="en-US" altLang="zh-TW" smtClean="0"/>
-              <a:t>February 2022</a:t>
+              <a:t>April 2022</a:t>
             </a:r>
             <a:endParaRPr lang="zh-TW" altLang="en-US"/>
           </a:p>
@@ -18429,7 +18439,7 @@
           <a:p>
             <a:r>
               <a:rPr lang="en-US" altLang="zh-TW" smtClean="0"/>
-              <a:t>February 2022</a:t>
+              <a:t>April 2022</a:t>
             </a:r>
             <a:endParaRPr lang="zh-TW" altLang="en-US"/>
           </a:p>
@@ -18742,7 +18752,7 @@
           <a:p>
             <a:r>
               <a:rPr lang="en-US" altLang="zh-TW" smtClean="0"/>
-              <a:t>February 2022</a:t>
+              <a:t>April 2022</a:t>
             </a:r>
             <a:endParaRPr lang="zh-TW" altLang="en-US"/>
           </a:p>
@@ -18871,32 +18881,8 @@
           <a:p>
             <a:r>
               <a:rPr lang="en-US" dirty="0"/>
-              <a:t>Backward View TD(</a:t>
-            </a:r>
-            <a:r>
-              <a:rPr lang="el-GR" dirty="0"/>
-              <a:t>λ)</a:t>
-            </a:r>
-            <a:endParaRPr lang="en-US" dirty="0"/>
-          </a:p>
-        </p:txBody>
-      </p:sp>
-      <p:sp>
-        <p:nvSpPr>
-          <p:cNvPr id="3" name="內容版面配置區 2"/>
-          <p:cNvSpPr>
-            <a:spLocks noGrp="1"/>
-          </p:cNvSpPr>
-          <p:nvPr>
-            <p:ph type="body" idx="1"/>
-          </p:nvPr>
-        </p:nvSpPr>
-        <p:spPr/>
-        <p:txBody>
-          <a:bodyPr/>
-          <a:lstStyle/>
-          <a:p>
-            <a:endParaRPr lang="en-US" dirty="0"/>
+              <a:t>Forward-View TD(λ) on Large Random Walk</a:t>
+            </a:r>
           </a:p>
         </p:txBody>
       </p:sp>
@@ -18917,7 +18903,7 @@
           <a:p>
             <a:r>
               <a:rPr lang="en-US" altLang="zh-TW" smtClean="0"/>
-              <a:t>February 2022</a:t>
+              <a:t>April 2022</a:t>
             </a:r>
             <a:endParaRPr lang="zh-TW" altLang="en-US"/>
           </a:p>
@@ -18964,6 +18950,180 @@
             <a:fld id="{5045ACBE-646A-47C1-AE77-0176D1C48DE1}" type="slidenum">
               <a:rPr lang="zh-TW" altLang="en-US" smtClean="0"/>
               <a:t>42</a:t>
+            </a:fld>
+            <a:endParaRPr lang="zh-TW" altLang="en-US"/>
+          </a:p>
+        </p:txBody>
+      </p:sp>
+      <p:pic>
+        <p:nvPicPr>
+          <p:cNvPr id="9" name="內容版面配置區 8" descr="畫面剪輯"/>
+          <p:cNvPicPr>
+            <a:picLocks noGrp="1" noChangeAspect="1"/>
+          </p:cNvPicPr>
+          <p:nvPr>
+            <p:ph idx="1"/>
+          </p:nvPr>
+        </p:nvPicPr>
+        <p:blipFill>
+          <a:blip r:embed="rId2">
+            <a:extLst>
+              <a:ext uri="{28A0092B-C50C-407E-A947-70E740481C1C}">
+                <a14:useLocalDpi xmlns:a14="http://schemas.microsoft.com/office/drawing/2010/main" val="0"/>
+              </a:ext>
+            </a:extLst>
+          </a:blip>
+          <a:stretch>
+            <a:fillRect/>
+          </a:stretch>
+        </p:blipFill>
+        <p:spPr>
+          <a:xfrm>
+            <a:off x="3458546" y="2122790"/>
+            <a:ext cx="5274908" cy="3047725"/>
+          </a:xfrm>
+        </p:spPr>
+      </p:pic>
+    </p:spTree>
+    <p:extLst>
+      <p:ext uri="{BB962C8B-B14F-4D97-AF65-F5344CB8AC3E}">
+        <p14:creationId xmlns:p14="http://schemas.microsoft.com/office/powerpoint/2010/main" val="4116187490"/>
+      </p:ext>
+    </p:extLst>
+  </p:cSld>
+  <p:clrMapOvr>
+    <a:masterClrMapping/>
+  </p:clrMapOvr>
+</p:sld>
+</file>
+
+<file path=ppt/slides/slide43.xml><?xml version="1.0" encoding="utf-8"?>
+<p:sld xmlns:a="http://schemas.openxmlformats.org/drawingml/2006/main" xmlns:r="http://schemas.openxmlformats.org/officeDocument/2006/relationships" xmlns:p="http://schemas.openxmlformats.org/presentationml/2006/main">
+  <p:cSld>
+    <p:spTree>
+      <p:nvGrpSpPr>
+        <p:cNvPr id="1" name=""/>
+        <p:cNvGrpSpPr/>
+        <p:nvPr/>
+      </p:nvGrpSpPr>
+      <p:grpSpPr>
+        <a:xfrm>
+          <a:off x="0" y="0"/>
+          <a:ext cx="0" cy="0"/>
+          <a:chOff x="0" y="0"/>
+          <a:chExt cx="0" cy="0"/>
+        </a:xfrm>
+      </p:grpSpPr>
+      <p:sp>
+        <p:nvSpPr>
+          <p:cNvPr id="2" name="標題 1"/>
+          <p:cNvSpPr>
+            <a:spLocks noGrp="1"/>
+          </p:cNvSpPr>
+          <p:nvPr>
+            <p:ph type="title"/>
+          </p:nvPr>
+        </p:nvSpPr>
+        <p:spPr/>
+        <p:txBody>
+          <a:bodyPr/>
+          <a:lstStyle/>
+          <a:p>
+            <a:r>
+              <a:rPr lang="en-US" dirty="0"/>
+              <a:t>Backward View TD(</a:t>
+            </a:r>
+            <a:r>
+              <a:rPr lang="el-GR" dirty="0"/>
+              <a:t>λ)</a:t>
+            </a:r>
+            <a:endParaRPr lang="en-US" dirty="0"/>
+          </a:p>
+        </p:txBody>
+      </p:sp>
+      <p:sp>
+        <p:nvSpPr>
+          <p:cNvPr id="3" name="內容版面配置區 2"/>
+          <p:cNvSpPr>
+            <a:spLocks noGrp="1"/>
+          </p:cNvSpPr>
+          <p:nvPr>
+            <p:ph type="body" idx="1"/>
+          </p:nvPr>
+        </p:nvSpPr>
+        <p:spPr/>
+        <p:txBody>
+          <a:bodyPr/>
+          <a:lstStyle/>
+          <a:p>
+            <a:endParaRPr lang="en-US" dirty="0"/>
+          </a:p>
+        </p:txBody>
+      </p:sp>
+      <p:sp>
+        <p:nvSpPr>
+          <p:cNvPr id="4" name="日期版面配置區 3"/>
+          <p:cNvSpPr>
+            <a:spLocks noGrp="1"/>
+          </p:cNvSpPr>
+          <p:nvPr>
+            <p:ph type="dt" sz="half" idx="10"/>
+          </p:nvPr>
+        </p:nvSpPr>
+        <p:spPr/>
+        <p:txBody>
+          <a:bodyPr/>
+          <a:lstStyle/>
+          <a:p>
+            <a:r>
+              <a:rPr lang="en-US" altLang="zh-TW" smtClean="0"/>
+              <a:t>April 2022</a:t>
+            </a:r>
+            <a:endParaRPr lang="zh-TW" altLang="en-US"/>
+          </a:p>
+        </p:txBody>
+      </p:sp>
+      <p:sp>
+        <p:nvSpPr>
+          <p:cNvPr id="5" name="頁尾版面配置區 4"/>
+          <p:cNvSpPr>
+            <a:spLocks noGrp="1"/>
+          </p:cNvSpPr>
+          <p:nvPr>
+            <p:ph type="ftr" sz="quarter" idx="11"/>
+          </p:nvPr>
+        </p:nvSpPr>
+        <p:spPr/>
+        <p:txBody>
+          <a:bodyPr/>
+          <a:lstStyle/>
+          <a:p>
+            <a:r>
+              <a:rPr lang="en-US" altLang="zh-TW" smtClean="0"/>
+              <a:t>National Kaohsiung University of Science and Technology</a:t>
+            </a:r>
+            <a:endParaRPr lang="zh-TW" altLang="en-US"/>
+          </a:p>
+        </p:txBody>
+      </p:sp>
+      <p:sp>
+        <p:nvSpPr>
+          <p:cNvPr id="6" name="投影片編號版面配置區 5"/>
+          <p:cNvSpPr>
+            <a:spLocks noGrp="1"/>
+          </p:cNvSpPr>
+          <p:nvPr>
+            <p:ph type="sldNum" sz="quarter" idx="12"/>
+          </p:nvPr>
+        </p:nvSpPr>
+        <p:spPr/>
+        <p:txBody>
+          <a:bodyPr/>
+          <a:lstStyle/>
+          <a:p>
+            <a:fld id="{5045ACBE-646A-47C1-AE77-0176D1C48DE1}" type="slidenum">
+              <a:rPr lang="zh-TW" altLang="en-US" smtClean="0"/>
+              <a:t>43</a:t>
             </a:fld>
             <a:endParaRPr lang="zh-TW" altLang="en-US"/>
           </a:p>
@@ -18989,7 +19149,7 @@
 </p:sld>
 </file>
 
-<file path=ppt/slides/slide43.xml><?xml version="1.0" encoding="utf-8"?>
+<file path=ppt/slides/slide44.xml><?xml version="1.0" encoding="utf-8"?>
 <p:sld xmlns:a="http://schemas.openxmlformats.org/drawingml/2006/main" xmlns:r="http://schemas.openxmlformats.org/officeDocument/2006/relationships" xmlns:p="http://schemas.openxmlformats.org/presentationml/2006/main">
   <p:cSld>
     <p:spTree>
@@ -19445,7 +19605,7 @@
           <a:p>
             <a:r>
               <a:rPr lang="en-US" altLang="zh-TW" smtClean="0"/>
-              <a:t>February 2022</a:t>
+              <a:t>April 2022</a:t>
             </a:r>
             <a:endParaRPr lang="zh-TW" altLang="en-US"/>
           </a:p>
@@ -19491,7 +19651,7 @@
           <a:p>
             <a:fld id="{5045ACBE-646A-47C1-AE77-0176D1C48DE1}" type="slidenum">
               <a:rPr lang="zh-TW" altLang="en-US" smtClean="0"/>
-              <a:t>43</a:t>
+              <a:t>44</a:t>
             </a:fld>
             <a:endParaRPr lang="zh-TW" altLang="en-US"/>
           </a:p>
@@ -19547,7 +19707,7 @@
 </p:sld>
 </file>
 
-<file path=ppt/slides/slide44.xml><?xml version="1.0" encoding="utf-8"?>
+<file path=ppt/slides/slide45.xml><?xml version="1.0" encoding="utf-8"?>
 <p:sld xmlns:a="http://schemas.openxmlformats.org/drawingml/2006/main" xmlns:r="http://schemas.openxmlformats.org/officeDocument/2006/relationships" xmlns:p="http://schemas.openxmlformats.org/presentationml/2006/main">
   <p:cSld>
     <p:spTree>
@@ -20115,7 +20275,7 @@
           <a:p>
             <a:r>
               <a:rPr lang="en-US" altLang="zh-TW" smtClean="0"/>
-              <a:t>February 2022</a:t>
+              <a:t>April 2022</a:t>
             </a:r>
             <a:endParaRPr lang="zh-TW" altLang="en-US"/>
           </a:p>
@@ -20161,7 +20321,7 @@
           <a:p>
             <a:fld id="{5045ACBE-646A-47C1-AE77-0176D1C48DE1}" type="slidenum">
               <a:rPr lang="zh-TW" altLang="en-US" smtClean="0"/>
-              <a:t>44</a:t>
+              <a:t>45</a:t>
             </a:fld>
             <a:endParaRPr lang="zh-TW" altLang="en-US"/>
           </a:p>
@@ -20180,7 +20340,7 @@
 </p:sld>
 </file>
 
-<file path=ppt/slides/slide45.xml><?xml version="1.0" encoding="utf-8"?>
+<file path=ppt/slides/slide46.xml><?xml version="1.0" encoding="utf-8"?>
 <p:sld xmlns:a="http://schemas.openxmlformats.org/drawingml/2006/main" xmlns:r="http://schemas.openxmlformats.org/officeDocument/2006/relationships" xmlns:p="http://schemas.openxmlformats.org/presentationml/2006/main">
   <p:cSld>
     <p:spTree>
@@ -20685,7 +20845,7 @@
           <a:p>
             <a:r>
               <a:rPr lang="en-US" altLang="zh-TW" smtClean="0"/>
-              <a:t>February 2022</a:t>
+              <a:t>April 2022</a:t>
             </a:r>
             <a:endParaRPr lang="zh-TW" altLang="en-US"/>
           </a:p>
@@ -20731,7 +20891,7 @@
           <a:p>
             <a:fld id="{5045ACBE-646A-47C1-AE77-0176D1C48DE1}" type="slidenum">
               <a:rPr lang="zh-TW" altLang="en-US" smtClean="0"/>
-              <a:t>45</a:t>
+              <a:t>46</a:t>
             </a:fld>
             <a:endParaRPr lang="zh-TW" altLang="en-US"/>
           </a:p>
@@ -20750,7 +20910,7 @@
 </p:sld>
 </file>
 
-<file path=ppt/slides/slide46.xml><?xml version="1.0" encoding="utf-8"?>
+<file path=ppt/slides/slide47.xml><?xml version="1.0" encoding="utf-8"?>
 <p:sld xmlns:a="http://schemas.openxmlformats.org/drawingml/2006/main" xmlns:r="http://schemas.openxmlformats.org/officeDocument/2006/relationships" xmlns:p="http://schemas.openxmlformats.org/presentationml/2006/main">
   <p:cSld>
     <p:spTree>
@@ -21244,174 +21404,7 @@
           <a:p>
             <a:r>
               <a:rPr lang="en-US" altLang="zh-TW" smtClean="0"/>
-              <a:t>February 2022</a:t>
-            </a:r>
-            <a:endParaRPr lang="zh-TW" altLang="en-US"/>
-          </a:p>
-        </p:txBody>
-      </p:sp>
-      <p:sp>
-        <p:nvSpPr>
-          <p:cNvPr id="5" name="頁尾版面配置區 4"/>
-          <p:cNvSpPr>
-            <a:spLocks noGrp="1"/>
-          </p:cNvSpPr>
-          <p:nvPr>
-            <p:ph type="ftr" sz="quarter" idx="11"/>
-          </p:nvPr>
-        </p:nvSpPr>
-        <p:spPr/>
-        <p:txBody>
-          <a:bodyPr/>
-          <a:lstStyle/>
-          <a:p>
-            <a:r>
-              <a:rPr lang="en-US" altLang="zh-TW" smtClean="0"/>
-              <a:t>National Kaohsiung University of Science and Technology</a:t>
-            </a:r>
-            <a:endParaRPr lang="zh-TW" altLang="en-US"/>
-          </a:p>
-        </p:txBody>
-      </p:sp>
-      <p:sp>
-        <p:nvSpPr>
-          <p:cNvPr id="6" name="投影片編號版面配置區 5"/>
-          <p:cNvSpPr>
-            <a:spLocks noGrp="1"/>
-          </p:cNvSpPr>
-          <p:nvPr>
-            <p:ph type="sldNum" sz="quarter" idx="12"/>
-          </p:nvPr>
-        </p:nvSpPr>
-        <p:spPr/>
-        <p:txBody>
-          <a:bodyPr/>
-          <a:lstStyle/>
-          <a:p>
-            <a:fld id="{5045ACBE-646A-47C1-AE77-0176D1C48DE1}" type="slidenum">
-              <a:rPr lang="zh-TW" altLang="en-US" smtClean="0"/>
-              <a:t>46</a:t>
-            </a:fld>
-            <a:endParaRPr lang="zh-TW" altLang="en-US"/>
-          </a:p>
-        </p:txBody>
-      </p:sp>
-    </p:spTree>
-    <p:extLst>
-      <p:ext uri="{BB962C8B-B14F-4D97-AF65-F5344CB8AC3E}">
-        <p14:creationId xmlns:p14="http://schemas.microsoft.com/office/powerpoint/2010/main" val="1489287338"/>
-      </p:ext>
-    </p:extLst>
-  </p:cSld>
-  <p:clrMapOvr>
-    <a:masterClrMapping/>
-  </p:clrMapOvr>
-</p:sld>
-</file>
-
-<file path=ppt/slides/slide47.xml><?xml version="1.0" encoding="utf-8"?>
-<p:sld xmlns:a="http://schemas.openxmlformats.org/drawingml/2006/main" xmlns:r="http://schemas.openxmlformats.org/officeDocument/2006/relationships" xmlns:p="http://schemas.openxmlformats.org/presentationml/2006/main">
-  <p:cSld>
-    <p:spTree>
-      <p:nvGrpSpPr>
-        <p:cNvPr id="1" name=""/>
-        <p:cNvGrpSpPr/>
-        <p:nvPr/>
-      </p:nvGrpSpPr>
-      <p:grpSpPr>
-        <a:xfrm>
-          <a:off x="0" y="0"/>
-          <a:ext cx="0" cy="0"/>
-          <a:chOff x="0" y="0"/>
-          <a:chExt cx="0" cy="0"/>
-        </a:xfrm>
-      </p:grpSpPr>
-      <p:sp>
-        <p:nvSpPr>
-          <p:cNvPr id="2" name="標題 1"/>
-          <p:cNvSpPr>
-            <a:spLocks noGrp="1"/>
-          </p:cNvSpPr>
-          <p:nvPr>
-            <p:ph type="title"/>
-          </p:nvPr>
-        </p:nvSpPr>
-        <p:spPr/>
-        <p:txBody>
-          <a:bodyPr/>
-          <a:lstStyle/>
-          <a:p>
-            <a:r>
-              <a:rPr lang="en-US" dirty="0" smtClean="0"/>
-              <a:t>Forward and Backward View of TD(</a:t>
-            </a:r>
-            <a:r>
-              <a:rPr lang="el-GR" dirty="0"/>
-              <a:t>λ)</a:t>
-            </a:r>
-            <a:endParaRPr lang="en-US" dirty="0"/>
-          </a:p>
-        </p:txBody>
-      </p:sp>
-      <p:sp>
-        <p:nvSpPr>
-          <p:cNvPr id="3" name="內容版面配置區 2"/>
-          <p:cNvSpPr>
-            <a:spLocks noGrp="1"/>
-          </p:cNvSpPr>
-          <p:nvPr>
-            <p:ph idx="1"/>
-          </p:nvPr>
-        </p:nvSpPr>
-        <p:spPr/>
-        <p:txBody>
-          <a:bodyPr/>
-          <a:lstStyle/>
-          <a:p>
-            <a:r>
-              <a:rPr lang="en-US" dirty="0"/>
-              <a:t>Forward view provides </a:t>
-            </a:r>
-            <a:r>
-              <a:rPr lang="en-US" dirty="0" smtClean="0"/>
-              <a:t>theory</a:t>
-            </a:r>
-          </a:p>
-          <a:p>
-            <a:r>
-              <a:rPr lang="en-US" dirty="0"/>
-              <a:t>Backward v</a:t>
-            </a:r>
-            <a:r>
-              <a:rPr lang="en-US" dirty="0" smtClean="0"/>
-              <a:t>iew assigns the credits to </a:t>
-            </a:r>
-            <a:r>
-              <a:rPr lang="en-US" smtClean="0"/>
-              <a:t>each state</a:t>
-            </a:r>
-            <a:endParaRPr lang="en-US" dirty="0"/>
-          </a:p>
-        </p:txBody>
-      </p:sp>
-      <p:sp>
-        <p:nvSpPr>
-          <p:cNvPr id="4" name="日期版面配置區 3"/>
-          <p:cNvSpPr>
-            <a:spLocks noGrp="1"/>
-          </p:cNvSpPr>
-          <p:nvPr>
-            <p:ph type="dt" sz="half" idx="10"/>
-          </p:nvPr>
-        </p:nvSpPr>
-        <p:spPr/>
-        <p:txBody>
-          <a:bodyPr/>
-          <a:lstStyle/>
-          <a:p>
-            <a:r>
-              <a:rPr lang="en-US" altLang="zh-TW" smtClean="0"/>
-              <a:t>February 2022</a:t>
+              <a:t>April 2022</a:t>
             </a:r>
             <a:endParaRPr lang="zh-TW" altLang="en-US"/>
           </a:p>
@@ -21466,7 +21459,7 @@
     </p:spTree>
     <p:extLst>
       <p:ext uri="{BB962C8B-B14F-4D97-AF65-F5344CB8AC3E}">
-        <p14:creationId xmlns:p14="http://schemas.microsoft.com/office/powerpoint/2010/main" val="4017290124"/>
+        <p14:creationId xmlns:p14="http://schemas.microsoft.com/office/powerpoint/2010/main" val="1489287338"/>
       </p:ext>
     </p:extLst>
   </p:cSld>
@@ -21509,10 +21502,14 @@
           <a:lstStyle/>
           <a:p>
             <a:r>
-              <a:rPr lang="en-US" altLang="zh-TW" dirty="0" smtClean="0"/>
-              <a:t>References</a:t>
-            </a:r>
-            <a:endParaRPr lang="zh-TW" altLang="en-US" dirty="0"/>
+              <a:rPr lang="en-US" dirty="0" smtClean="0"/>
+              <a:t>Forward and Backward View of TD(</a:t>
+            </a:r>
+            <a:r>
+              <a:rPr lang="el-GR" dirty="0"/>
+              <a:t>λ)</a:t>
+            </a:r>
+            <a:endParaRPr lang="en-US" dirty="0"/>
           </a:p>
         </p:txBody>
       </p:sp>
@@ -21533,11 +21530,27 @@
           <a:p>
             <a:r>
               <a:rPr lang="en-US" dirty="0"/>
-              <a:t>Introduction to Reinforcement Learning with David Silver, DeepMind x UCL.</a:t>
-            </a:r>
-          </a:p>
-          <a:p>
-            <a:endParaRPr lang="en-US" altLang="zh-TW" dirty="0"/>
+              <a:t>Forward view provides </a:t>
+            </a:r>
+            <a:r>
+              <a:rPr lang="en-US" dirty="0" smtClean="0"/>
+              <a:t>theory</a:t>
+            </a:r>
+          </a:p>
+          <a:p>
+            <a:r>
+              <a:rPr lang="en-US" dirty="0"/>
+              <a:t>Backward v</a:t>
+            </a:r>
+            <a:r>
+              <a:rPr lang="en-US" dirty="0" smtClean="0"/>
+              <a:t>iew assigns the credits to </a:t>
+            </a:r>
+            <a:r>
+              <a:rPr lang="en-US" smtClean="0"/>
+              <a:t>each state</a:t>
+            </a:r>
+            <a:endParaRPr lang="en-US" dirty="0"/>
           </a:p>
         </p:txBody>
       </p:sp>
@@ -21558,7 +21571,7 @@
           <a:p>
             <a:r>
               <a:rPr lang="en-US" altLang="zh-TW" smtClean="0"/>
-              <a:t>February 2022</a:t>
+              <a:t>April 2022</a:t>
             </a:r>
             <a:endParaRPr lang="zh-TW" altLang="en-US"/>
           </a:p>
@@ -21605,6 +21618,153 @@
             <a:fld id="{5045ACBE-646A-47C1-AE77-0176D1C48DE1}" type="slidenum">
               <a:rPr lang="zh-TW" altLang="en-US" smtClean="0"/>
               <a:t>48</a:t>
+            </a:fld>
+            <a:endParaRPr lang="zh-TW" altLang="en-US"/>
+          </a:p>
+        </p:txBody>
+      </p:sp>
+    </p:spTree>
+    <p:extLst>
+      <p:ext uri="{BB962C8B-B14F-4D97-AF65-F5344CB8AC3E}">
+        <p14:creationId xmlns:p14="http://schemas.microsoft.com/office/powerpoint/2010/main" val="4017290124"/>
+      </p:ext>
+    </p:extLst>
+  </p:cSld>
+  <p:clrMapOvr>
+    <a:masterClrMapping/>
+  </p:clrMapOvr>
+</p:sld>
+</file>
+
+<file path=ppt/slides/slide49.xml><?xml version="1.0" encoding="utf-8"?>
+<p:sld xmlns:a="http://schemas.openxmlformats.org/drawingml/2006/main" xmlns:r="http://schemas.openxmlformats.org/officeDocument/2006/relationships" xmlns:p="http://schemas.openxmlformats.org/presentationml/2006/main">
+  <p:cSld>
+    <p:spTree>
+      <p:nvGrpSpPr>
+        <p:cNvPr id="1" name=""/>
+        <p:cNvGrpSpPr/>
+        <p:nvPr/>
+      </p:nvGrpSpPr>
+      <p:grpSpPr>
+        <a:xfrm>
+          <a:off x="0" y="0"/>
+          <a:ext cx="0" cy="0"/>
+          <a:chOff x="0" y="0"/>
+          <a:chExt cx="0" cy="0"/>
+        </a:xfrm>
+      </p:grpSpPr>
+      <p:sp>
+        <p:nvSpPr>
+          <p:cNvPr id="2" name="標題 1"/>
+          <p:cNvSpPr>
+            <a:spLocks noGrp="1"/>
+          </p:cNvSpPr>
+          <p:nvPr>
+            <p:ph type="title"/>
+          </p:nvPr>
+        </p:nvSpPr>
+        <p:spPr/>
+        <p:txBody>
+          <a:bodyPr/>
+          <a:lstStyle/>
+          <a:p>
+            <a:r>
+              <a:rPr lang="en-US" altLang="zh-TW" dirty="0" smtClean="0"/>
+              <a:t>References</a:t>
+            </a:r>
+            <a:endParaRPr lang="zh-TW" altLang="en-US" dirty="0"/>
+          </a:p>
+        </p:txBody>
+      </p:sp>
+      <p:sp>
+        <p:nvSpPr>
+          <p:cNvPr id="3" name="內容版面配置區 2"/>
+          <p:cNvSpPr>
+            <a:spLocks noGrp="1"/>
+          </p:cNvSpPr>
+          <p:nvPr>
+            <p:ph idx="1"/>
+          </p:nvPr>
+        </p:nvSpPr>
+        <p:spPr/>
+        <p:txBody>
+          <a:bodyPr/>
+          <a:lstStyle/>
+          <a:p>
+            <a:r>
+              <a:rPr lang="en-US" dirty="0"/>
+              <a:t>Introduction to Reinforcement Learning with David Silver, DeepMind x UCL.</a:t>
+            </a:r>
+          </a:p>
+          <a:p>
+            <a:endParaRPr lang="en-US" altLang="zh-TW" dirty="0"/>
+          </a:p>
+        </p:txBody>
+      </p:sp>
+      <p:sp>
+        <p:nvSpPr>
+          <p:cNvPr id="4" name="日期版面配置區 3"/>
+          <p:cNvSpPr>
+            <a:spLocks noGrp="1"/>
+          </p:cNvSpPr>
+          <p:nvPr>
+            <p:ph type="dt" sz="half" idx="10"/>
+          </p:nvPr>
+        </p:nvSpPr>
+        <p:spPr/>
+        <p:txBody>
+          <a:bodyPr/>
+          <a:lstStyle/>
+          <a:p>
+            <a:r>
+              <a:rPr lang="en-US" altLang="zh-TW" smtClean="0"/>
+              <a:t>April 2022</a:t>
+            </a:r>
+            <a:endParaRPr lang="zh-TW" altLang="en-US"/>
+          </a:p>
+        </p:txBody>
+      </p:sp>
+      <p:sp>
+        <p:nvSpPr>
+          <p:cNvPr id="5" name="頁尾版面配置區 4"/>
+          <p:cNvSpPr>
+            <a:spLocks noGrp="1"/>
+          </p:cNvSpPr>
+          <p:nvPr>
+            <p:ph type="ftr" sz="quarter" idx="11"/>
+          </p:nvPr>
+        </p:nvSpPr>
+        <p:spPr/>
+        <p:txBody>
+          <a:bodyPr/>
+          <a:lstStyle/>
+          <a:p>
+            <a:r>
+              <a:rPr lang="en-US" altLang="zh-TW" smtClean="0"/>
+              <a:t>National Kaohsiung University of Science and Technology</a:t>
+            </a:r>
+            <a:endParaRPr lang="zh-TW" altLang="en-US"/>
+          </a:p>
+        </p:txBody>
+      </p:sp>
+      <p:sp>
+        <p:nvSpPr>
+          <p:cNvPr id="6" name="投影片編號版面配置區 5"/>
+          <p:cNvSpPr>
+            <a:spLocks noGrp="1"/>
+          </p:cNvSpPr>
+          <p:nvPr>
+            <p:ph type="sldNum" sz="quarter" idx="12"/>
+          </p:nvPr>
+        </p:nvSpPr>
+        <p:spPr/>
+        <p:txBody>
+          <a:bodyPr/>
+          <a:lstStyle/>
+          <a:p>
+            <a:fld id="{5045ACBE-646A-47C1-AE77-0176D1C48DE1}" type="slidenum">
+              <a:rPr lang="zh-TW" altLang="en-US" smtClean="0"/>
+              <a:t>49</a:t>
             </a:fld>
             <a:endParaRPr lang="zh-TW" altLang="en-US"/>
           </a:p>
@@ -21770,7 +21930,7 @@
           <a:p>
             <a:r>
               <a:rPr lang="en-US" altLang="zh-TW" smtClean="0"/>
-              <a:t>February 2022</a:t>
+              <a:t>April 2022</a:t>
             </a:r>
             <a:endParaRPr lang="zh-TW" altLang="en-US"/>
           </a:p>
@@ -21911,7 +22071,7 @@
           <a:p>
             <a:r>
               <a:rPr lang="en-US" altLang="zh-TW" smtClean="0"/>
-              <a:t>February 2022</a:t>
+              <a:t>April 2022</a:t>
             </a:r>
             <a:endParaRPr lang="zh-TW" altLang="en-US"/>
           </a:p>
@@ -22128,7 +22288,7 @@
           <a:p>
             <a:r>
               <a:rPr lang="en-US" altLang="zh-TW" smtClean="0"/>
-              <a:t>February 2022</a:t>
+              <a:t>April 2022</a:t>
             </a:r>
             <a:endParaRPr lang="zh-TW" altLang="en-US"/>
           </a:p>
@@ -22741,7 +22901,7 @@
           <a:p>
             <a:r>
               <a:rPr lang="en-US" altLang="zh-TW" smtClean="0"/>
-              <a:t>February 2022</a:t>
+              <a:t>April 2022</a:t>
             </a:r>
             <a:endParaRPr lang="zh-TW" altLang="en-US"/>
           </a:p>
@@ -23358,7 +23518,7 @@
           <a:p>
             <a:r>
               <a:rPr lang="en-US" altLang="zh-TW" smtClean="0"/>
-              <a:t>February 2022</a:t>
+              <a:t>April 2022</a:t>
             </a:r>
             <a:endParaRPr lang="zh-TW" altLang="en-US"/>
           </a:p>

</xml_diff>